<commit_message>
#121 preparing structure for managed model in tests
</commit_message>
<xml_diff>
--- a/platform/configuration/configuration/src/test/easy/summary.pptx
+++ b/platform/configuration/configuration/src/test/easy/summary.pptx
@@ -278,7 +278,7 @@
           <a:p>
             <a:fld id="{D5B82AE6-E612-48AC-BCA1-8D558D7A7716}" type="datetimeFigureOut">
               <a:rPr lang="en-DE" smtClean="0"/>
-              <a:t>05/12/2022</a:t>
+              <a:t>29/12/2022</a:t>
             </a:fld>
             <a:endParaRPr lang="en-DE"/>
           </a:p>
@@ -478,7 +478,7 @@
           <a:p>
             <a:fld id="{D5B82AE6-E612-48AC-BCA1-8D558D7A7716}" type="datetimeFigureOut">
               <a:rPr lang="en-DE" smtClean="0"/>
-              <a:t>05/12/2022</a:t>
+              <a:t>29/12/2022</a:t>
             </a:fld>
             <a:endParaRPr lang="en-DE"/>
           </a:p>
@@ -688,7 +688,7 @@
           <a:p>
             <a:fld id="{D5B82AE6-E612-48AC-BCA1-8D558D7A7716}" type="datetimeFigureOut">
               <a:rPr lang="en-DE" smtClean="0"/>
-              <a:t>05/12/2022</a:t>
+              <a:t>29/12/2022</a:t>
             </a:fld>
             <a:endParaRPr lang="en-DE"/>
           </a:p>
@@ -888,7 +888,7 @@
           <a:p>
             <a:fld id="{D5B82AE6-E612-48AC-BCA1-8D558D7A7716}" type="datetimeFigureOut">
               <a:rPr lang="en-DE" smtClean="0"/>
-              <a:t>05/12/2022</a:t>
+              <a:t>29/12/2022</a:t>
             </a:fld>
             <a:endParaRPr lang="en-DE"/>
           </a:p>
@@ -1164,7 +1164,7 @@
           <a:p>
             <a:fld id="{D5B82AE6-E612-48AC-BCA1-8D558D7A7716}" type="datetimeFigureOut">
               <a:rPr lang="en-DE" smtClean="0"/>
-              <a:t>05/12/2022</a:t>
+              <a:t>29/12/2022</a:t>
             </a:fld>
             <a:endParaRPr lang="en-DE"/>
           </a:p>
@@ -1432,7 +1432,7 @@
           <a:p>
             <a:fld id="{D5B82AE6-E612-48AC-BCA1-8D558D7A7716}" type="datetimeFigureOut">
               <a:rPr lang="en-DE" smtClean="0"/>
-              <a:t>05/12/2022</a:t>
+              <a:t>29/12/2022</a:t>
             </a:fld>
             <a:endParaRPr lang="en-DE"/>
           </a:p>
@@ -1847,7 +1847,7 @@
           <a:p>
             <a:fld id="{D5B82AE6-E612-48AC-BCA1-8D558D7A7716}" type="datetimeFigureOut">
               <a:rPr lang="en-DE" smtClean="0"/>
-              <a:t>05/12/2022</a:t>
+              <a:t>29/12/2022</a:t>
             </a:fld>
             <a:endParaRPr lang="en-DE"/>
           </a:p>
@@ -1989,7 +1989,7 @@
           <a:p>
             <a:fld id="{D5B82AE6-E612-48AC-BCA1-8D558D7A7716}" type="datetimeFigureOut">
               <a:rPr lang="en-DE" smtClean="0"/>
-              <a:t>05/12/2022</a:t>
+              <a:t>29/12/2022</a:t>
             </a:fld>
             <a:endParaRPr lang="en-DE"/>
           </a:p>
@@ -2102,7 +2102,7 @@
           <a:p>
             <a:fld id="{D5B82AE6-E612-48AC-BCA1-8D558D7A7716}" type="datetimeFigureOut">
               <a:rPr lang="en-DE" smtClean="0"/>
-              <a:t>05/12/2022</a:t>
+              <a:t>29/12/2022</a:t>
             </a:fld>
             <a:endParaRPr lang="en-DE"/>
           </a:p>
@@ -2415,7 +2415,7 @@
           <a:p>
             <a:fld id="{D5B82AE6-E612-48AC-BCA1-8D558D7A7716}" type="datetimeFigureOut">
               <a:rPr lang="en-DE" smtClean="0"/>
-              <a:t>05/12/2022</a:t>
+              <a:t>29/12/2022</a:t>
             </a:fld>
             <a:endParaRPr lang="en-DE"/>
           </a:p>
@@ -2704,7 +2704,7 @@
           <a:p>
             <a:fld id="{D5B82AE6-E612-48AC-BCA1-8D558D7A7716}" type="datetimeFigureOut">
               <a:rPr lang="en-DE" smtClean="0"/>
-              <a:t>05/12/2022</a:t>
+              <a:t>29/12/2022</a:t>
             </a:fld>
             <a:endParaRPr lang="en-DE"/>
           </a:p>
@@ -2947,7 +2947,7 @@
           <a:p>
             <a:fld id="{D5B82AE6-E612-48AC-BCA1-8D558D7A7716}" type="datetimeFigureOut">
               <a:rPr lang="en-DE" smtClean="0"/>
-              <a:t>05/12/2022</a:t>
+              <a:t>29/12/2022</a:t>
             </a:fld>
             <a:endParaRPr lang="en-DE"/>
           </a:p>
@@ -11817,9 +11817,9 @@
               <a:lumOff val="80000"/>
             </a:schemeClr>
           </a:solidFill>
-          <a:ln>
+          <a:ln w="28575">
             <a:solidFill>
-              <a:schemeClr val="accent1"/>
+              <a:schemeClr val="accent6"/>
             </a:solidFill>
           </a:ln>
         </p:spPr>
@@ -11876,9 +11876,9 @@
               <a:lumOff val="80000"/>
             </a:schemeClr>
           </a:solidFill>
-          <a:ln>
+          <a:ln w="28575">
             <a:solidFill>
-              <a:schemeClr val="accent1"/>
+              <a:schemeClr val="accent6"/>
             </a:solidFill>
           </a:ln>
         </p:spPr>
@@ -11929,9 +11929,9 @@
               <a:lumOff val="80000"/>
             </a:schemeClr>
           </a:solidFill>
-          <a:ln>
+          <a:ln w="28575">
             <a:solidFill>
-              <a:schemeClr val="accent1"/>
+              <a:schemeClr val="accent6"/>
             </a:solidFill>
           </a:ln>
         </p:spPr>
@@ -12034,7 +12034,7 @@
         </p:nvSpPr>
         <p:spPr>
           <a:xfrm>
-            <a:off x="3734847" y="2253149"/>
+            <a:off x="3739737" y="2130900"/>
             <a:ext cx="2339487" cy="923330"/>
           </a:xfrm>
           <a:prstGeom prst="rect">
@@ -12144,8 +12144,8 @@
         </p:nvSpPr>
         <p:spPr>
           <a:xfrm>
-            <a:off x="222253" y="2117854"/>
-            <a:ext cx="3016147" cy="2308324"/>
+            <a:off x="222253" y="1487060"/>
+            <a:ext cx="3223255" cy="3139321"/>
           </a:xfrm>
           <a:prstGeom prst="rect">
             <a:avLst/>
@@ -12177,20 +12177,47 @@
             </a:r>
             <a:r>
               <a:rPr lang="en-GB" dirty="0"/>
-              <a:t>Shared platform config</a:t>
-            </a:r>
-          </a:p>
-          <a:p>
-            <a:r>
-              <a:rPr lang="en-GB" dirty="0"/>
-              <a:t>   Structural test (compilation, </a:t>
+              <a:t>Shared platform config (in </a:t>
             </a:r>
             <a:br>
               <a:rPr lang="en-GB" dirty="0"/>
             </a:br>
             <a:r>
               <a:rPr lang="en-GB" dirty="0"/>
-              <a:t>   file contents)</a:t>
+              <a:t>   folder </a:t>
+            </a:r>
+            <a:r>
+              <a:rPr lang="en-GB" dirty="0">
+                <a:latin typeface="Consolas" panose="020B0609020204030204" pitchFamily="49" charset="0"/>
+              </a:rPr>
+              <a:t>common</a:t>
+            </a:r>
+            <a:r>
+              <a:rPr lang="en-GB" dirty="0"/>
+              <a:t>)</a:t>
+            </a:r>
+          </a:p>
+          <a:p>
+            <a:r>
+              <a:rPr lang="en-GB" dirty="0"/>
+              <a:t>   Structural test (compilation, </a:t>
+            </a:r>
+            <a:br>
+              <a:rPr lang="en-GB" dirty="0"/>
+            </a:br>
+            <a:r>
+              <a:rPr lang="en-GB" dirty="0"/>
+              <a:t>   file contents in folder </a:t>
+            </a:r>
+            <a:r>
+              <a:rPr lang="en-GB" dirty="0">
+                <a:latin typeface="Consolas" panose="020B0609020204030204" pitchFamily="49" charset="0"/>
+              </a:rPr>
+              <a:t>single</a:t>
+            </a:r>
+            <a:r>
+              <a:rPr lang="en-GB" dirty="0"/>
+              <a:t>)</a:t>
             </a:r>
           </a:p>
           <a:p>
@@ -12217,6 +12244,19 @@
               <a:t>   (old style)</a:t>
             </a:r>
           </a:p>
+          <a:p>
+            <a:r>
+              <a:rPr lang="en-GB" dirty="0"/>
+              <a:t>   In managed model structure </a:t>
+            </a:r>
+            <a:br>
+              <a:rPr lang="en-GB" dirty="0"/>
+            </a:br>
+            <a:r>
+              <a:rPr lang="en-GB" dirty="0"/>
+              <a:t>   (own folder)</a:t>
+            </a:r>
+          </a:p>
         </p:txBody>
       </p:sp>
       <p:sp>
@@ -12233,7 +12273,7 @@
         </p:nvSpPr>
         <p:spPr>
           <a:xfrm>
-            <a:off x="257115" y="2478923"/>
+            <a:off x="257115" y="1848129"/>
             <a:ext cx="173041" cy="190793"/>
           </a:xfrm>
           <a:prstGeom prst="rect">
@@ -12338,9 +12378,9 @@
           <p:nvPr/>
         </p:nvCxnSpPr>
         <p:spPr>
-          <a:xfrm rot="5400000">
-            <a:off x="4640941" y="1989499"/>
-            <a:ext cx="527300" cy="12700"/>
+          <a:xfrm rot="16200000" flipH="1">
+            <a:off x="4704511" y="1925929"/>
+            <a:ext cx="405051" cy="4890"/>
           </a:xfrm>
           <a:prstGeom prst="bentConnector3">
             <a:avLst>
@@ -12693,7 +12733,7 @@
         </p:nvSpPr>
         <p:spPr>
           <a:xfrm>
-            <a:off x="252827" y="2723185"/>
+            <a:off x="252827" y="2405344"/>
             <a:ext cx="173041" cy="190793"/>
           </a:xfrm>
           <a:prstGeom prst="rect">
@@ -12748,7 +12788,7 @@
         </p:nvSpPr>
         <p:spPr>
           <a:xfrm>
-            <a:off x="252826" y="3310230"/>
+            <a:off x="252826" y="2948379"/>
             <a:ext cx="173041" cy="190793"/>
           </a:xfrm>
           <a:prstGeom prst="rect">
@@ -12803,7 +12843,7 @@
         </p:nvSpPr>
         <p:spPr>
           <a:xfrm>
-            <a:off x="252825" y="3848626"/>
+            <a:off x="252825" y="3486775"/>
             <a:ext cx="173041" cy="190793"/>
           </a:xfrm>
           <a:prstGeom prst="rect">
@@ -12813,6 +12853,58 @@
           <a:ln w="38100">
             <a:solidFill>
               <a:schemeClr val="accent1"/>
+            </a:solidFill>
+          </a:ln>
+        </p:spPr>
+        <p:style>
+          <a:lnRef idx="2">
+            <a:schemeClr val="accent1">
+              <a:shade val="50000"/>
+            </a:schemeClr>
+          </a:lnRef>
+          <a:fillRef idx="1">
+            <a:schemeClr val="accent1"/>
+          </a:fillRef>
+          <a:effectRef idx="0">
+            <a:schemeClr val="accent1"/>
+          </a:effectRef>
+          <a:fontRef idx="minor">
+            <a:schemeClr val="lt1"/>
+          </a:fontRef>
+        </p:style>
+        <p:txBody>
+          <a:bodyPr rtlCol="0" anchor="ctr"/>
+          <a:lstStyle/>
+          <a:p>
+            <a:pPr algn="ctr"/>
+            <a:endParaRPr lang="en-DE"/>
+          </a:p>
+        </p:txBody>
+      </p:sp>
+      <p:sp>
+        <p:nvSpPr>
+          <p:cNvPr id="28" name="Rectangle 27">
+            <a:extLst>
+              <a:ext uri="{FF2B5EF4-FFF2-40B4-BE49-F238E27FC236}">
+                <a16:creationId xmlns:a16="http://schemas.microsoft.com/office/drawing/2014/main" id="{84E3513E-BBA0-45EB-9ABE-5C2F73C43CE1}"/>
+              </a:ext>
+            </a:extLst>
+          </p:cNvPr>
+          <p:cNvSpPr/>
+          <p:nvPr/>
+        </p:nvSpPr>
+        <p:spPr>
+          <a:xfrm>
+            <a:off x="252825" y="4040192"/>
+            <a:ext cx="173041" cy="190793"/>
+          </a:xfrm>
+          <a:prstGeom prst="rect">
+            <a:avLst/>
+          </a:prstGeom>
+          <a:noFill/>
+          <a:ln w="28575" cmpd="sng">
+            <a:solidFill>
+              <a:schemeClr val="accent6"/>
             </a:solidFill>
           </a:ln>
         </p:spPr>

</xml_diff>

<commit_message>
generating array values for channel connectors
</commit_message>
<xml_diff>
--- a/platform/configuration/configuration/src/test/easy/summary.pptx
+++ b/platform/configuration/configuration/src/test/easy/summary.pptx
@@ -278,7 +278,7 @@
           <a:p>
             <a:fld id="{D5B82AE6-E612-48AC-BCA1-8D558D7A7716}" type="datetimeFigureOut">
               <a:rPr lang="en-DE" smtClean="0"/>
-              <a:t>29/12/2022</a:t>
+              <a:t>04/02/2023</a:t>
             </a:fld>
             <a:endParaRPr lang="en-DE"/>
           </a:p>
@@ -478,7 +478,7 @@
           <a:p>
             <a:fld id="{D5B82AE6-E612-48AC-BCA1-8D558D7A7716}" type="datetimeFigureOut">
               <a:rPr lang="en-DE" smtClean="0"/>
-              <a:t>29/12/2022</a:t>
+              <a:t>04/02/2023</a:t>
             </a:fld>
             <a:endParaRPr lang="en-DE"/>
           </a:p>
@@ -688,7 +688,7 @@
           <a:p>
             <a:fld id="{D5B82AE6-E612-48AC-BCA1-8D558D7A7716}" type="datetimeFigureOut">
               <a:rPr lang="en-DE" smtClean="0"/>
-              <a:t>29/12/2022</a:t>
+              <a:t>04/02/2023</a:t>
             </a:fld>
             <a:endParaRPr lang="en-DE"/>
           </a:p>
@@ -888,7 +888,7 @@
           <a:p>
             <a:fld id="{D5B82AE6-E612-48AC-BCA1-8D558D7A7716}" type="datetimeFigureOut">
               <a:rPr lang="en-DE" smtClean="0"/>
-              <a:t>29/12/2022</a:t>
+              <a:t>04/02/2023</a:t>
             </a:fld>
             <a:endParaRPr lang="en-DE"/>
           </a:p>
@@ -1164,7 +1164,7 @@
           <a:p>
             <a:fld id="{D5B82AE6-E612-48AC-BCA1-8D558D7A7716}" type="datetimeFigureOut">
               <a:rPr lang="en-DE" smtClean="0"/>
-              <a:t>29/12/2022</a:t>
+              <a:t>04/02/2023</a:t>
             </a:fld>
             <a:endParaRPr lang="en-DE"/>
           </a:p>
@@ -1432,7 +1432,7 @@
           <a:p>
             <a:fld id="{D5B82AE6-E612-48AC-BCA1-8D558D7A7716}" type="datetimeFigureOut">
               <a:rPr lang="en-DE" smtClean="0"/>
-              <a:t>29/12/2022</a:t>
+              <a:t>04/02/2023</a:t>
             </a:fld>
             <a:endParaRPr lang="en-DE"/>
           </a:p>
@@ -1847,7 +1847,7 @@
           <a:p>
             <a:fld id="{D5B82AE6-E612-48AC-BCA1-8D558D7A7716}" type="datetimeFigureOut">
               <a:rPr lang="en-DE" smtClean="0"/>
-              <a:t>29/12/2022</a:t>
+              <a:t>04/02/2023</a:t>
             </a:fld>
             <a:endParaRPr lang="en-DE"/>
           </a:p>
@@ -1989,7 +1989,7 @@
           <a:p>
             <a:fld id="{D5B82AE6-E612-48AC-BCA1-8D558D7A7716}" type="datetimeFigureOut">
               <a:rPr lang="en-DE" smtClean="0"/>
-              <a:t>29/12/2022</a:t>
+              <a:t>04/02/2023</a:t>
             </a:fld>
             <a:endParaRPr lang="en-DE"/>
           </a:p>
@@ -2102,7 +2102,7 @@
           <a:p>
             <a:fld id="{D5B82AE6-E612-48AC-BCA1-8D558D7A7716}" type="datetimeFigureOut">
               <a:rPr lang="en-DE" smtClean="0"/>
-              <a:t>29/12/2022</a:t>
+              <a:t>04/02/2023</a:t>
             </a:fld>
             <a:endParaRPr lang="en-DE"/>
           </a:p>
@@ -2415,7 +2415,7 @@
           <a:p>
             <a:fld id="{D5B82AE6-E612-48AC-BCA1-8D558D7A7716}" type="datetimeFigureOut">
               <a:rPr lang="en-DE" smtClean="0"/>
-              <a:t>29/12/2022</a:t>
+              <a:t>04/02/2023</a:t>
             </a:fld>
             <a:endParaRPr lang="en-DE"/>
           </a:p>
@@ -2704,7 +2704,7 @@
           <a:p>
             <a:fld id="{D5B82AE6-E612-48AC-BCA1-8D558D7A7716}" type="datetimeFigureOut">
               <a:rPr lang="en-DE" smtClean="0"/>
-              <a:t>29/12/2022</a:t>
+              <a:t>04/02/2023</a:t>
             </a:fld>
             <a:endParaRPr lang="en-DE"/>
           </a:p>
@@ -2947,7 +2947,7 @@
           <a:p>
             <a:fld id="{D5B82AE6-E612-48AC-BCA1-8D558D7A7716}" type="datetimeFigureOut">
               <a:rPr lang="en-DE" smtClean="0"/>
-              <a:t>29/12/2022</a:t>
+              <a:t>04/02/2023</a:t>
             </a:fld>
             <a:endParaRPr lang="en-DE"/>
           </a:p>
@@ -9834,6 +9834,46 @@
             <a:endParaRPr lang="de-DE" dirty="0"/>
           </a:p>
           <a:p>
+            <a:pPr lvl="1"/>
+            <a:r>
+              <a:rPr lang="de-DE" dirty="0" err="1"/>
+              <a:t>Applies</a:t>
+            </a:r>
+            <a:r>
+              <a:rPr lang="de-DE" dirty="0"/>
+              <a:t> </a:t>
+            </a:r>
+            <a:r>
+              <a:rPr lang="de-DE" dirty="0" err="1"/>
+              <a:t>object</a:t>
+            </a:r>
+            <a:r>
+              <a:rPr lang="de-DE" dirty="0"/>
+              <a:t> </a:t>
+            </a:r>
+            <a:r>
+              <a:rPr lang="de-DE" dirty="0" err="1"/>
+              <a:t>arrays</a:t>
+            </a:r>
+            <a:r>
+              <a:rPr lang="de-DE" dirty="0"/>
+              <a:t> </a:t>
+            </a:r>
+            <a:r>
+              <a:rPr lang="de-DE" dirty="0" err="1"/>
+              <a:t>to</a:t>
+            </a:r>
+            <a:r>
+              <a:rPr lang="de-DE" dirty="0"/>
+              <a:t> </a:t>
+            </a:r>
+            <a:r>
+              <a:rPr lang="de-DE" dirty="0" err="1"/>
+              <a:t>connectors</a:t>
+            </a:r>
+            <a:endParaRPr lang="de-DE" dirty="0"/>
+          </a:p>
+          <a:p>
             <a:r>
               <a:rPr lang="de-DE" dirty="0"/>
               <a:t>Purpose: </a:t>

</xml_diff>

<commit_message>
testing record arrays also with the platform interface artifact
</commit_message>
<xml_diff>
--- a/platform/configuration/configuration/src/test/easy/summary.pptx
+++ b/platform/configuration/configuration/src/test/easy/summary.pptx
@@ -278,7 +278,7 @@
           <a:p>
             <a:fld id="{D5B82AE6-E612-48AC-BCA1-8D558D7A7716}" type="datetimeFigureOut">
               <a:rPr lang="en-DE" smtClean="0"/>
-              <a:t>04/02/2023</a:t>
+              <a:t>05/02/2023</a:t>
             </a:fld>
             <a:endParaRPr lang="en-DE"/>
           </a:p>
@@ -478,7 +478,7 @@
           <a:p>
             <a:fld id="{D5B82AE6-E612-48AC-BCA1-8D558D7A7716}" type="datetimeFigureOut">
               <a:rPr lang="en-DE" smtClean="0"/>
-              <a:t>04/02/2023</a:t>
+              <a:t>05/02/2023</a:t>
             </a:fld>
             <a:endParaRPr lang="en-DE"/>
           </a:p>
@@ -688,7 +688,7 @@
           <a:p>
             <a:fld id="{D5B82AE6-E612-48AC-BCA1-8D558D7A7716}" type="datetimeFigureOut">
               <a:rPr lang="en-DE" smtClean="0"/>
-              <a:t>04/02/2023</a:t>
+              <a:t>05/02/2023</a:t>
             </a:fld>
             <a:endParaRPr lang="en-DE"/>
           </a:p>
@@ -888,7 +888,7 @@
           <a:p>
             <a:fld id="{D5B82AE6-E612-48AC-BCA1-8D558D7A7716}" type="datetimeFigureOut">
               <a:rPr lang="en-DE" smtClean="0"/>
-              <a:t>04/02/2023</a:t>
+              <a:t>05/02/2023</a:t>
             </a:fld>
             <a:endParaRPr lang="en-DE"/>
           </a:p>
@@ -1164,7 +1164,7 @@
           <a:p>
             <a:fld id="{D5B82AE6-E612-48AC-BCA1-8D558D7A7716}" type="datetimeFigureOut">
               <a:rPr lang="en-DE" smtClean="0"/>
-              <a:t>04/02/2023</a:t>
+              <a:t>05/02/2023</a:t>
             </a:fld>
             <a:endParaRPr lang="en-DE"/>
           </a:p>
@@ -1432,7 +1432,7 @@
           <a:p>
             <a:fld id="{D5B82AE6-E612-48AC-BCA1-8D558D7A7716}" type="datetimeFigureOut">
               <a:rPr lang="en-DE" smtClean="0"/>
-              <a:t>04/02/2023</a:t>
+              <a:t>05/02/2023</a:t>
             </a:fld>
             <a:endParaRPr lang="en-DE"/>
           </a:p>
@@ -1847,7 +1847,7 @@
           <a:p>
             <a:fld id="{D5B82AE6-E612-48AC-BCA1-8D558D7A7716}" type="datetimeFigureOut">
               <a:rPr lang="en-DE" smtClean="0"/>
-              <a:t>04/02/2023</a:t>
+              <a:t>05/02/2023</a:t>
             </a:fld>
             <a:endParaRPr lang="en-DE"/>
           </a:p>
@@ -1989,7 +1989,7 @@
           <a:p>
             <a:fld id="{D5B82AE6-E612-48AC-BCA1-8D558D7A7716}" type="datetimeFigureOut">
               <a:rPr lang="en-DE" smtClean="0"/>
-              <a:t>04/02/2023</a:t>
+              <a:t>05/02/2023</a:t>
             </a:fld>
             <a:endParaRPr lang="en-DE"/>
           </a:p>
@@ -2102,7 +2102,7 @@
           <a:p>
             <a:fld id="{D5B82AE6-E612-48AC-BCA1-8D558D7A7716}" type="datetimeFigureOut">
               <a:rPr lang="en-DE" smtClean="0"/>
-              <a:t>04/02/2023</a:t>
+              <a:t>05/02/2023</a:t>
             </a:fld>
             <a:endParaRPr lang="en-DE"/>
           </a:p>
@@ -2415,7 +2415,7 @@
           <a:p>
             <a:fld id="{D5B82AE6-E612-48AC-BCA1-8D558D7A7716}" type="datetimeFigureOut">
               <a:rPr lang="en-DE" smtClean="0"/>
-              <a:t>04/02/2023</a:t>
+              <a:t>05/02/2023</a:t>
             </a:fld>
             <a:endParaRPr lang="en-DE"/>
           </a:p>
@@ -2704,7 +2704,7 @@
           <a:p>
             <a:fld id="{D5B82AE6-E612-48AC-BCA1-8D558D7A7716}" type="datetimeFigureOut">
               <a:rPr lang="en-DE" smtClean="0"/>
-              <a:t>04/02/2023</a:t>
+              <a:t>05/02/2023</a:t>
             </a:fld>
             <a:endParaRPr lang="en-DE"/>
           </a:p>
@@ -2947,7 +2947,7 @@
           <a:p>
             <a:fld id="{D5B82AE6-E612-48AC-BCA1-8D558D7A7716}" type="datetimeFigureOut">
               <a:rPr lang="en-DE" smtClean="0"/>
-              <a:t>04/02/2023</a:t>
+              <a:t>05/02/2023</a:t>
             </a:fld>
             <a:endParaRPr lang="en-DE"/>
           </a:p>
@@ -7640,7 +7640,29 @@
             </a:r>
             <a:r>
               <a:rPr lang="de-DE" dirty="0" err="1"/>
-              <a:t>generation</a:t>
+              <a:t>generating</a:t>
+            </a:r>
+            <a:r>
+              <a:rPr lang="de-DE" dirty="0"/>
+              <a:t> a </a:t>
+            </a:r>
+            <a:r>
+              <a:rPr lang="de-DE" dirty="0" err="1"/>
+              <a:t>serializer</a:t>
+            </a:r>
+            <a:endParaRPr lang="de-DE" dirty="0"/>
+          </a:p>
+          <a:p>
+            <a:r>
+              <a:rPr lang="de-DE" dirty="0"/>
+              <a:t>Purpose: </a:t>
+            </a:r>
+          </a:p>
+          <a:p>
+            <a:pPr lvl="1"/>
+            <a:r>
+              <a:rPr lang="de-DE" dirty="0" err="1"/>
+              <a:t>Two</a:t>
             </a:r>
             <a:r>
               <a:rPr lang="de-DE" dirty="0"/>
@@ -7648,29 +7670,7 @@
             </a:r>
             <a:r>
               <a:rPr lang="de-DE" dirty="0" err="1"/>
-              <a:t>of</a:t>
-            </a:r>
-            <a:r>
-              <a:rPr lang="de-DE" dirty="0"/>
-              <a:t> a </a:t>
-            </a:r>
-            <a:r>
-              <a:rPr lang="de-DE" dirty="0" err="1"/>
-              <a:t>serializer</a:t>
-            </a:r>
-            <a:endParaRPr lang="de-DE" dirty="0"/>
-          </a:p>
-          <a:p>
-            <a:r>
-              <a:rPr lang="de-DE" dirty="0"/>
-              <a:t>Purpose: </a:t>
-            </a:r>
-          </a:p>
-          <a:p>
-            <a:pPr lvl="1"/>
-            <a:r>
-              <a:rPr lang="de-DE" dirty="0" err="1"/>
-              <a:t>Two</a:t>
+              <a:t>connectors</a:t>
             </a:r>
             <a:r>
               <a:rPr lang="de-DE" dirty="0"/>
@@ -7678,7 +7678,7 @@
             </a:r>
             <a:r>
               <a:rPr lang="de-DE" dirty="0" err="1"/>
-              <a:t>connectors</a:t>
+              <a:t>with</a:t>
             </a:r>
             <a:r>
               <a:rPr lang="de-DE" dirty="0"/>
@@ -7686,7 +7686,7 @@
             </a:r>
             <a:r>
               <a:rPr lang="de-DE" dirty="0" err="1"/>
-              <a:t>with</a:t>
+              <a:t>data</a:t>
             </a:r>
             <a:r>
               <a:rPr lang="de-DE" dirty="0"/>
@@ -7694,7 +7694,51 @@
             </a:r>
             <a:r>
               <a:rPr lang="de-DE" dirty="0" err="1"/>
-              <a:t>data</a:t>
+              <a:t>transformation</a:t>
+            </a:r>
+            <a:endParaRPr lang="de-DE" dirty="0"/>
+          </a:p>
+          <a:p>
+            <a:pPr lvl="1"/>
+            <a:r>
+              <a:rPr lang="de-DE" dirty="0"/>
+              <a:t>RTSA </a:t>
+            </a:r>
+            <a:r>
+              <a:rPr lang="de-DE" dirty="0" err="1"/>
+              <a:t>integration</a:t>
+            </a:r>
+            <a:endParaRPr lang="de-DE" dirty="0"/>
+          </a:p>
+          <a:p>
+            <a:pPr lvl="1"/>
+            <a:r>
+              <a:rPr lang="de-DE" dirty="0"/>
+              <a:t>Service </a:t>
+            </a:r>
+            <a:r>
+              <a:rPr lang="de-DE" dirty="0" err="1"/>
+              <a:t>family</a:t>
+            </a:r>
+            <a:endParaRPr lang="de-DE" dirty="0"/>
+          </a:p>
+          <a:p>
+            <a:pPr lvl="1"/>
+            <a:r>
+              <a:rPr lang="de-DE" dirty="0"/>
+              <a:t>Service </a:t>
+            </a:r>
+            <a:r>
+              <a:rPr lang="de-DE" dirty="0" err="1"/>
+              <a:t>parameters</a:t>
+            </a:r>
+            <a:endParaRPr lang="de-DE" dirty="0"/>
+          </a:p>
+          <a:p>
+            <a:pPr lvl="1"/>
+            <a:r>
+              <a:rPr lang="de-DE" dirty="0" err="1"/>
+              <a:t>Applies</a:t>
             </a:r>
             <a:r>
               <a:rPr lang="de-DE" dirty="0"/>
@@ -7702,43 +7746,31 @@
             </a:r>
             <a:r>
               <a:rPr lang="de-DE" dirty="0" err="1"/>
-              <a:t>transformation</a:t>
-            </a:r>
-            <a:endParaRPr lang="de-DE" dirty="0"/>
-          </a:p>
-          <a:p>
-            <a:pPr lvl="1"/>
+              <a:t>object</a:t>
+            </a:r>
             <a:r>
               <a:rPr lang="de-DE" dirty="0"/>
-              <a:t>RTSA </a:t>
+              <a:t> </a:t>
             </a:r>
             <a:r>
               <a:rPr lang="de-DE" dirty="0" err="1"/>
-              <a:t>integration</a:t>
-            </a:r>
-            <a:endParaRPr lang="de-DE" dirty="0"/>
-          </a:p>
-          <a:p>
-            <a:pPr lvl="1"/>
+              <a:t>arrays</a:t>
+            </a:r>
             <a:r>
               <a:rPr lang="de-DE" dirty="0"/>
-              <a:t>Service </a:t>
+              <a:t> </a:t>
             </a:r>
             <a:r>
               <a:rPr lang="de-DE" dirty="0" err="1"/>
-              <a:t>family</a:t>
-            </a:r>
-            <a:endParaRPr lang="de-DE" dirty="0"/>
-          </a:p>
-          <a:p>
-            <a:pPr lvl="1"/>
+              <a:t>to</a:t>
+            </a:r>
             <a:r>
               <a:rPr lang="de-DE" dirty="0"/>
-              <a:t>Service </a:t>
+              <a:t> </a:t>
             </a:r>
             <a:r>
               <a:rPr lang="de-DE" dirty="0" err="1"/>
-              <a:t>parameters</a:t>
+              <a:t>connectors</a:t>
             </a:r>
             <a:endParaRPr lang="de-DE" dirty="0"/>
           </a:p>
@@ -9774,7 +9806,23 @@
             </a:r>
             <a:r>
               <a:rPr lang="de-DE" dirty="0" err="1"/>
-              <a:t>generation</a:t>
+              <a:t>generating</a:t>
+            </a:r>
+            <a:r>
+              <a:rPr lang="de-DE"/>
+              <a:t> a </a:t>
+            </a:r>
+            <a:r>
+              <a:rPr lang="de-DE" dirty="0" err="1"/>
+              <a:t>serializer</a:t>
+            </a:r>
+            <a:endParaRPr lang="de-DE" dirty="0"/>
+          </a:p>
+          <a:p>
+            <a:pPr lvl="1"/>
+            <a:r>
+              <a:rPr lang="de-DE" dirty="0" err="1"/>
+              <a:t>Derived</a:t>
             </a:r>
             <a:r>
               <a:rPr lang="de-DE" dirty="0"/>
@@ -9782,23 +9830,22 @@
             </a:r>
             <a:r>
               <a:rPr lang="de-DE" dirty="0" err="1"/>
-              <a:t>of</a:t>
+              <a:t>from</a:t>
             </a:r>
             <a:r>
               <a:rPr lang="de-DE" dirty="0"/>
-              <a:t> a </a:t>
+              <a:t> SerializerConfig1</a:t>
+            </a:r>
+          </a:p>
+          <a:p>
+            <a:pPr lvl="1"/>
+            <a:r>
+              <a:rPr lang="de-DE" dirty="0"/>
+              <a:t>Old-style not-</a:t>
             </a:r>
             <a:r>
               <a:rPr lang="de-DE" dirty="0" err="1"/>
-              <a:t>serializer</a:t>
-            </a:r>
-            <a:endParaRPr lang="de-DE" dirty="0"/>
-          </a:p>
-          <a:p>
-            <a:pPr lvl="1"/>
-            <a:r>
-              <a:rPr lang="de-DE" dirty="0" err="1"/>
-              <a:t>Derived</a:t>
+              <a:t>shared</a:t>
             </a:r>
             <a:r>
               <a:rPr lang="de-DE" dirty="0"/>
@@ -9806,70 +9853,7 @@
             </a:r>
             <a:r>
               <a:rPr lang="de-DE" dirty="0" err="1"/>
-              <a:t>from</a:t>
-            </a:r>
-            <a:r>
-              <a:rPr lang="de-DE" dirty="0"/>
-              <a:t> SerializerConfig1</a:t>
-            </a:r>
-          </a:p>
-          <a:p>
-            <a:pPr lvl="1"/>
-            <a:r>
-              <a:rPr lang="de-DE" dirty="0"/>
-              <a:t>Old-style not-</a:t>
-            </a:r>
-            <a:r>
-              <a:rPr lang="de-DE" dirty="0" err="1"/>
-              <a:t>separated</a:t>
-            </a:r>
-            <a:r>
-              <a:rPr lang="de-DE" dirty="0"/>
-              <a:t> </a:t>
-            </a:r>
-            <a:r>
-              <a:rPr lang="de-DE" dirty="0" err="1"/>
               <a:t>interfaces</a:t>
-            </a:r>
-            <a:endParaRPr lang="de-DE" dirty="0"/>
-          </a:p>
-          <a:p>
-            <a:pPr lvl="1"/>
-            <a:r>
-              <a:rPr lang="de-DE" dirty="0" err="1"/>
-              <a:t>Applies</a:t>
-            </a:r>
-            <a:r>
-              <a:rPr lang="de-DE" dirty="0"/>
-              <a:t> </a:t>
-            </a:r>
-            <a:r>
-              <a:rPr lang="de-DE" dirty="0" err="1"/>
-              <a:t>object</a:t>
-            </a:r>
-            <a:r>
-              <a:rPr lang="de-DE" dirty="0"/>
-              <a:t> </a:t>
-            </a:r>
-            <a:r>
-              <a:rPr lang="de-DE" dirty="0" err="1"/>
-              <a:t>arrays</a:t>
-            </a:r>
-            <a:r>
-              <a:rPr lang="de-DE" dirty="0"/>
-              <a:t> </a:t>
-            </a:r>
-            <a:r>
-              <a:rPr lang="de-DE" dirty="0" err="1"/>
-              <a:t>to</a:t>
-            </a:r>
-            <a:r>
-              <a:rPr lang="de-DE" dirty="0"/>
-              <a:t> </a:t>
-            </a:r>
-            <a:r>
-              <a:rPr lang="de-DE" dirty="0" err="1"/>
-              <a:t>connectors</a:t>
             </a:r>
             <a:endParaRPr lang="de-DE" dirty="0"/>
           </a:p>

</xml_diff>

<commit_message>
simple backward flow for UI testing
</commit_message>
<xml_diff>
--- a/platform/configuration/configuration/src/test/easy/summary.pptx
+++ b/platform/configuration/configuration/src/test/easy/summary.pptx
@@ -278,7 +278,7 @@
           <a:p>
             <a:fld id="{D5B82AE6-E612-48AC-BCA1-8D558D7A7716}" type="datetimeFigureOut">
               <a:rPr lang="en-DE" smtClean="0"/>
-              <a:t>05/02/2023</a:t>
+              <a:t>30/11/2023</a:t>
             </a:fld>
             <a:endParaRPr lang="en-DE"/>
           </a:p>
@@ -478,7 +478,7 @@
           <a:p>
             <a:fld id="{D5B82AE6-E612-48AC-BCA1-8D558D7A7716}" type="datetimeFigureOut">
               <a:rPr lang="en-DE" smtClean="0"/>
-              <a:t>05/02/2023</a:t>
+              <a:t>30/11/2023</a:t>
             </a:fld>
             <a:endParaRPr lang="en-DE"/>
           </a:p>
@@ -688,7 +688,7 @@
           <a:p>
             <a:fld id="{D5B82AE6-E612-48AC-BCA1-8D558D7A7716}" type="datetimeFigureOut">
               <a:rPr lang="en-DE" smtClean="0"/>
-              <a:t>05/02/2023</a:t>
+              <a:t>30/11/2023</a:t>
             </a:fld>
             <a:endParaRPr lang="en-DE"/>
           </a:p>
@@ -888,7 +888,7 @@
           <a:p>
             <a:fld id="{D5B82AE6-E612-48AC-BCA1-8D558D7A7716}" type="datetimeFigureOut">
               <a:rPr lang="en-DE" smtClean="0"/>
-              <a:t>05/02/2023</a:t>
+              <a:t>30/11/2023</a:t>
             </a:fld>
             <a:endParaRPr lang="en-DE"/>
           </a:p>
@@ -1164,7 +1164,7 @@
           <a:p>
             <a:fld id="{D5B82AE6-E612-48AC-BCA1-8D558D7A7716}" type="datetimeFigureOut">
               <a:rPr lang="en-DE" smtClean="0"/>
-              <a:t>05/02/2023</a:t>
+              <a:t>30/11/2023</a:t>
             </a:fld>
             <a:endParaRPr lang="en-DE"/>
           </a:p>
@@ -1432,7 +1432,7 @@
           <a:p>
             <a:fld id="{D5B82AE6-E612-48AC-BCA1-8D558D7A7716}" type="datetimeFigureOut">
               <a:rPr lang="en-DE" smtClean="0"/>
-              <a:t>05/02/2023</a:t>
+              <a:t>30/11/2023</a:t>
             </a:fld>
             <a:endParaRPr lang="en-DE"/>
           </a:p>
@@ -1847,7 +1847,7 @@
           <a:p>
             <a:fld id="{D5B82AE6-E612-48AC-BCA1-8D558D7A7716}" type="datetimeFigureOut">
               <a:rPr lang="en-DE" smtClean="0"/>
-              <a:t>05/02/2023</a:t>
+              <a:t>30/11/2023</a:t>
             </a:fld>
             <a:endParaRPr lang="en-DE"/>
           </a:p>
@@ -1989,7 +1989,7 @@
           <a:p>
             <a:fld id="{D5B82AE6-E612-48AC-BCA1-8D558D7A7716}" type="datetimeFigureOut">
               <a:rPr lang="en-DE" smtClean="0"/>
-              <a:t>05/02/2023</a:t>
+              <a:t>30/11/2023</a:t>
             </a:fld>
             <a:endParaRPr lang="en-DE"/>
           </a:p>
@@ -2102,7 +2102,7 @@
           <a:p>
             <a:fld id="{D5B82AE6-E612-48AC-BCA1-8D558D7A7716}" type="datetimeFigureOut">
               <a:rPr lang="en-DE" smtClean="0"/>
-              <a:t>05/02/2023</a:t>
+              <a:t>30/11/2023</a:t>
             </a:fld>
             <a:endParaRPr lang="en-DE"/>
           </a:p>
@@ -2415,7 +2415,7 @@
           <a:p>
             <a:fld id="{D5B82AE6-E612-48AC-BCA1-8D558D7A7716}" type="datetimeFigureOut">
               <a:rPr lang="en-DE" smtClean="0"/>
-              <a:t>05/02/2023</a:t>
+              <a:t>30/11/2023</a:t>
             </a:fld>
             <a:endParaRPr lang="en-DE"/>
           </a:p>
@@ -2704,7 +2704,7 @@
           <a:p>
             <a:fld id="{D5B82AE6-E612-48AC-BCA1-8D558D7A7716}" type="datetimeFigureOut">
               <a:rPr lang="en-DE" smtClean="0"/>
-              <a:t>05/02/2023</a:t>
+              <a:t>30/11/2023</a:t>
             </a:fld>
             <a:endParaRPr lang="en-DE"/>
           </a:p>
@@ -2947,7 +2947,7 @@
           <a:p>
             <a:fld id="{D5B82AE6-E612-48AC-BCA1-8D558D7A7716}" type="datetimeFigureOut">
               <a:rPr lang="en-DE" smtClean="0"/>
-              <a:t>05/02/2023</a:t>
+              <a:t>30/11/2023</a:t>
             </a:fld>
             <a:endParaRPr lang="en-DE"/>
           </a:p>
@@ -13668,6 +13668,360 @@
           </a:fontRef>
         </p:style>
       </p:cxnSp>
+      <p:cxnSp>
+        <p:nvCxnSpPr>
+          <p:cNvPr id="13" name="Connector: Elbow 12">
+            <a:extLst>
+              <a:ext uri="{FF2B5EF4-FFF2-40B4-BE49-F238E27FC236}">
+                <a16:creationId xmlns:a16="http://schemas.microsoft.com/office/drawing/2014/main" id="{3D86C15D-C565-4A39-A426-B2A8320B47B3}"/>
+              </a:ext>
+            </a:extLst>
+          </p:cNvPr>
+          <p:cNvCxnSpPr>
+            <a:cxnSpLocks/>
+            <a:stCxn id="17" idx="1"/>
+            <a:endCxn id="19" idx="3"/>
+          </p:cNvCxnSpPr>
+          <p:nvPr/>
+        </p:nvCxnSpPr>
+        <p:spPr>
+          <a:xfrm rot="10800000" flipV="1">
+            <a:off x="5261739" y="3439073"/>
+            <a:ext cx="2377461" cy="3177"/>
+          </a:xfrm>
+          <a:prstGeom prst="bentConnector3">
+            <a:avLst/>
+          </a:prstGeom>
+          <a:ln>
+            <a:prstDash val="dash"/>
+            <a:tailEnd type="triangle"/>
+          </a:ln>
+        </p:spPr>
+        <p:style>
+          <a:lnRef idx="1">
+            <a:schemeClr val="accent1"/>
+          </a:lnRef>
+          <a:fillRef idx="0">
+            <a:schemeClr val="accent1"/>
+          </a:fillRef>
+          <a:effectRef idx="0">
+            <a:schemeClr val="accent1"/>
+          </a:effectRef>
+          <a:fontRef idx="minor">
+            <a:schemeClr val="tx1"/>
+          </a:fontRef>
+        </p:style>
+      </p:cxnSp>
+      <p:sp>
+        <p:nvSpPr>
+          <p:cNvPr id="16" name="TextBox 15">
+            <a:extLst>
+              <a:ext uri="{FF2B5EF4-FFF2-40B4-BE49-F238E27FC236}">
+                <a16:creationId xmlns:a16="http://schemas.microsoft.com/office/drawing/2014/main" id="{974DAF39-CF89-4E61-A2AD-0E5AF94D4B12}"/>
+              </a:ext>
+            </a:extLst>
+          </p:cNvPr>
+          <p:cNvSpPr txBox="1"/>
+          <p:nvPr/>
+        </p:nvSpPr>
+        <p:spPr>
+          <a:xfrm>
+            <a:off x="6013480" y="3441700"/>
+            <a:ext cx="1074140" cy="369332"/>
+          </a:xfrm>
+          <a:prstGeom prst="rect">
+            <a:avLst/>
+          </a:prstGeom>
+          <a:noFill/>
+        </p:spPr>
+        <p:txBody>
+          <a:bodyPr wrap="none" rtlCol="0">
+            <a:spAutoFit/>
+          </a:bodyPr>
+          <a:lstStyle/>
+          <a:p>
+            <a:r>
+              <a:rPr lang="en-GB" i="1" dirty="0"/>
+              <a:t>Feedback</a:t>
+            </a:r>
+            <a:endParaRPr lang="en-DE" i="1" dirty="0"/>
+          </a:p>
+        </p:txBody>
+      </p:sp>
+      <p:sp>
+        <p:nvSpPr>
+          <p:cNvPr id="17" name="Rectangle 16">
+            <a:extLst>
+              <a:ext uri="{FF2B5EF4-FFF2-40B4-BE49-F238E27FC236}">
+                <a16:creationId xmlns:a16="http://schemas.microsoft.com/office/drawing/2014/main" id="{0D39F825-A963-4CE1-9518-4ACDD3756FB5}"/>
+              </a:ext>
+            </a:extLst>
+          </p:cNvPr>
+          <p:cNvSpPr/>
+          <p:nvPr/>
+        </p:nvSpPr>
+        <p:spPr>
+          <a:xfrm>
+            <a:off x="7639199" y="3351701"/>
+            <a:ext cx="183304" cy="174746"/>
+          </a:xfrm>
+          <a:prstGeom prst="rect">
+            <a:avLst/>
+          </a:prstGeom>
+          <a:noFill/>
+          <a:ln>
+            <a:noFill/>
+          </a:ln>
+        </p:spPr>
+        <p:style>
+          <a:lnRef idx="2">
+            <a:schemeClr val="accent1">
+              <a:shade val="50000"/>
+            </a:schemeClr>
+          </a:lnRef>
+          <a:fillRef idx="1">
+            <a:schemeClr val="accent1"/>
+          </a:fillRef>
+          <a:effectRef idx="0">
+            <a:schemeClr val="accent1"/>
+          </a:effectRef>
+          <a:fontRef idx="minor">
+            <a:schemeClr val="lt1"/>
+          </a:fontRef>
+        </p:style>
+        <p:txBody>
+          <a:bodyPr rtlCol="0" anchor="ctr"/>
+          <a:lstStyle/>
+          <a:p>
+            <a:pPr algn="ctr"/>
+            <a:endParaRPr lang="en-DE"/>
+          </a:p>
+        </p:txBody>
+      </p:sp>
+      <p:sp>
+        <p:nvSpPr>
+          <p:cNvPr id="19" name="Rectangle 18">
+            <a:extLst>
+              <a:ext uri="{FF2B5EF4-FFF2-40B4-BE49-F238E27FC236}">
+                <a16:creationId xmlns:a16="http://schemas.microsoft.com/office/drawing/2014/main" id="{82571673-7BBE-46DF-B389-8F7D987D0A29}"/>
+              </a:ext>
+            </a:extLst>
+          </p:cNvPr>
+          <p:cNvSpPr/>
+          <p:nvPr/>
+        </p:nvSpPr>
+        <p:spPr>
+          <a:xfrm>
+            <a:off x="5078434" y="3354878"/>
+            <a:ext cx="183304" cy="174746"/>
+          </a:xfrm>
+          <a:prstGeom prst="rect">
+            <a:avLst/>
+          </a:prstGeom>
+          <a:noFill/>
+          <a:ln>
+            <a:noFill/>
+          </a:ln>
+        </p:spPr>
+        <p:style>
+          <a:lnRef idx="2">
+            <a:schemeClr val="accent1">
+              <a:shade val="50000"/>
+            </a:schemeClr>
+          </a:lnRef>
+          <a:fillRef idx="1">
+            <a:schemeClr val="accent1"/>
+          </a:fillRef>
+          <a:effectRef idx="0">
+            <a:schemeClr val="accent1"/>
+          </a:effectRef>
+          <a:fontRef idx="minor">
+            <a:schemeClr val="lt1"/>
+          </a:fontRef>
+        </p:style>
+        <p:txBody>
+          <a:bodyPr rtlCol="0" anchor="ctr"/>
+          <a:lstStyle/>
+          <a:p>
+            <a:pPr algn="ctr"/>
+            <a:endParaRPr lang="en-DE"/>
+          </a:p>
+        </p:txBody>
+      </p:sp>
+      <p:sp>
+        <p:nvSpPr>
+          <p:cNvPr id="21" name="TextBox 20">
+            <a:extLst>
+              <a:ext uri="{FF2B5EF4-FFF2-40B4-BE49-F238E27FC236}">
+                <a16:creationId xmlns:a16="http://schemas.microsoft.com/office/drawing/2014/main" id="{1521D499-3BB7-4C11-985A-9D0D91D348F2}"/>
+              </a:ext>
+            </a:extLst>
+          </p:cNvPr>
+          <p:cNvSpPr txBox="1"/>
+          <p:nvPr/>
+        </p:nvSpPr>
+        <p:spPr>
+          <a:xfrm>
+            <a:off x="3219734" y="5916643"/>
+            <a:ext cx="7735772" cy="646331"/>
+          </a:xfrm>
+          <a:prstGeom prst="rect">
+            <a:avLst/>
+          </a:prstGeom>
+          <a:noFill/>
+        </p:spPr>
+        <p:txBody>
+          <a:bodyPr wrap="none" rtlCol="0">
+            <a:spAutoFit/>
+          </a:bodyPr>
+          <a:lstStyle/>
+          <a:p>
+            <a:r>
+              <a:rPr lang="de-DE" i="1" dirty="0"/>
+              <a:t>Feedback </a:t>
+            </a:r>
+            <a:r>
+              <a:rPr lang="de-DE" i="1" dirty="0" err="1"/>
+              <a:t>is</a:t>
+            </a:r>
+            <a:r>
+              <a:rPr lang="de-DE" i="1" dirty="0"/>
+              <a:t> an </a:t>
+            </a:r>
+            <a:r>
+              <a:rPr lang="de-DE" i="1" dirty="0" err="1"/>
+              <a:t>example</a:t>
+            </a:r>
+            <a:r>
+              <a:rPr lang="de-DE" i="1" dirty="0"/>
+              <a:t> </a:t>
+            </a:r>
+            <a:r>
+              <a:rPr lang="de-DE" i="1" dirty="0" err="1"/>
+              <a:t>for</a:t>
+            </a:r>
+            <a:r>
+              <a:rPr lang="de-DE" i="1" dirty="0"/>
+              <a:t> a simple (</a:t>
+            </a:r>
+            <a:r>
+              <a:rPr lang="de-DE" i="1" dirty="0" err="1"/>
+              <a:t>pub-sub</a:t>
+            </a:r>
+            <a:r>
+              <a:rPr lang="de-DE" i="1" dirty="0"/>
+              <a:t>, </a:t>
+            </a:r>
+            <a:r>
+              <a:rPr lang="de-DE" i="1" dirty="0" err="1"/>
+              <a:t>asynchronous</a:t>
+            </a:r>
+            <a:r>
+              <a:rPr lang="de-DE" i="1" dirty="0"/>
+              <a:t>) </a:t>
+            </a:r>
+            <a:r>
+              <a:rPr lang="de-DE" i="1" dirty="0" err="1"/>
+              <a:t>backward</a:t>
+            </a:r>
+            <a:r>
+              <a:rPr lang="de-DE" i="1" dirty="0"/>
+              <a:t> </a:t>
+            </a:r>
+            <a:r>
+              <a:rPr lang="de-DE" i="1" dirty="0" err="1"/>
+              <a:t>channel</a:t>
+            </a:r>
+            <a:r>
+              <a:rPr lang="de-DE" i="1" dirty="0"/>
+              <a:t>.</a:t>
+            </a:r>
+          </a:p>
+          <a:p>
+            <a:r>
+              <a:rPr lang="de-DE" i="1" dirty="0" err="1"/>
+              <a:t>Although</a:t>
+            </a:r>
+            <a:r>
+              <a:rPr lang="de-DE" i="1" dirty="0"/>
+              <a:t> not </a:t>
+            </a:r>
+            <a:r>
+              <a:rPr lang="de-DE" i="1" dirty="0" err="1"/>
+              <a:t>implemented</a:t>
+            </a:r>
+            <a:r>
+              <a:rPr lang="de-DE" i="1" dirty="0"/>
+              <a:t> </a:t>
+            </a:r>
+            <a:r>
+              <a:rPr lang="de-DE" i="1" dirty="0" err="1"/>
+              <a:t>used</a:t>
+            </a:r>
+            <a:r>
+              <a:rPr lang="de-DE" i="1" dirty="0"/>
+              <a:t>/</a:t>
+            </a:r>
+            <a:r>
+              <a:rPr lang="de-DE" i="1" dirty="0" err="1"/>
+              <a:t>here</a:t>
+            </a:r>
+            <a:r>
+              <a:rPr lang="de-DE" i="1" dirty="0"/>
+              <a:t>, </a:t>
+            </a:r>
+            <a:r>
+              <a:rPr lang="de-DE" i="1" dirty="0" err="1"/>
+              <a:t>it</a:t>
+            </a:r>
+            <a:r>
+              <a:rPr lang="de-DE" i="1" dirty="0"/>
+              <a:t> </a:t>
+            </a:r>
+            <a:r>
+              <a:rPr lang="de-DE" i="1" dirty="0" err="1"/>
+              <a:t>is</a:t>
+            </a:r>
+            <a:r>
+              <a:rPr lang="de-DE" i="1" dirty="0"/>
+              <a:t> </a:t>
+            </a:r>
+            <a:r>
+              <a:rPr lang="de-DE" i="1" dirty="0" err="1"/>
+              <a:t>used</a:t>
+            </a:r>
+            <a:r>
+              <a:rPr lang="de-DE" i="1" dirty="0"/>
+              <a:t> in </a:t>
+            </a:r>
+            <a:r>
+              <a:rPr lang="de-DE" i="1" dirty="0" err="1"/>
+              <a:t>testing</a:t>
+            </a:r>
+            <a:r>
+              <a:rPr lang="de-DE" i="1" dirty="0"/>
+              <a:t> </a:t>
+            </a:r>
+            <a:r>
+              <a:rPr lang="de-DE" i="1" dirty="0" err="1"/>
+              <a:t>the</a:t>
+            </a:r>
+            <a:r>
+              <a:rPr lang="de-DE" i="1" dirty="0"/>
+              <a:t> </a:t>
+            </a:r>
+            <a:r>
+              <a:rPr lang="de-DE" i="1" dirty="0" err="1"/>
+              <a:t>management</a:t>
+            </a:r>
+            <a:r>
+              <a:rPr lang="de-DE" i="1" dirty="0"/>
+              <a:t> UI.</a:t>
+            </a:r>
+            <a:endParaRPr lang="en-DE" i="1" dirty="0"/>
+          </a:p>
+        </p:txBody>
+      </p:sp>
     </p:spTree>
     <p:extLst>
       <p:ext uri="{BB962C8B-B14F-4D97-AF65-F5344CB8AC3E}">

</xml_diff>

<commit_message>
#162 ZIP, service parameters in SimpleMesh for UI testing
</commit_message>
<xml_diff>
--- a/platform/configuration/configuration/src/test/easy/summary.pptx
+++ b/platform/configuration/configuration/src/test/easy/summary.pptx
@@ -278,7 +278,7 @@
           <a:p>
             <a:fld id="{D5B82AE6-E612-48AC-BCA1-8D558D7A7716}" type="datetimeFigureOut">
               <a:rPr lang="en-DE" smtClean="0"/>
-              <a:t>30/11/2023</a:t>
+              <a:t>07/12/2023</a:t>
             </a:fld>
             <a:endParaRPr lang="en-DE"/>
           </a:p>
@@ -478,7 +478,7 @@
           <a:p>
             <a:fld id="{D5B82AE6-E612-48AC-BCA1-8D558D7A7716}" type="datetimeFigureOut">
               <a:rPr lang="en-DE" smtClean="0"/>
-              <a:t>30/11/2023</a:t>
+              <a:t>07/12/2023</a:t>
             </a:fld>
             <a:endParaRPr lang="en-DE"/>
           </a:p>
@@ -688,7 +688,7 @@
           <a:p>
             <a:fld id="{D5B82AE6-E612-48AC-BCA1-8D558D7A7716}" type="datetimeFigureOut">
               <a:rPr lang="en-DE" smtClean="0"/>
-              <a:t>30/11/2023</a:t>
+              <a:t>07/12/2023</a:t>
             </a:fld>
             <a:endParaRPr lang="en-DE"/>
           </a:p>
@@ -888,7 +888,7 @@
           <a:p>
             <a:fld id="{D5B82AE6-E612-48AC-BCA1-8D558D7A7716}" type="datetimeFigureOut">
               <a:rPr lang="en-DE" smtClean="0"/>
-              <a:t>30/11/2023</a:t>
+              <a:t>07/12/2023</a:t>
             </a:fld>
             <a:endParaRPr lang="en-DE"/>
           </a:p>
@@ -1164,7 +1164,7 @@
           <a:p>
             <a:fld id="{D5B82AE6-E612-48AC-BCA1-8D558D7A7716}" type="datetimeFigureOut">
               <a:rPr lang="en-DE" smtClean="0"/>
-              <a:t>30/11/2023</a:t>
+              <a:t>07/12/2023</a:t>
             </a:fld>
             <a:endParaRPr lang="en-DE"/>
           </a:p>
@@ -1432,7 +1432,7 @@
           <a:p>
             <a:fld id="{D5B82AE6-E612-48AC-BCA1-8D558D7A7716}" type="datetimeFigureOut">
               <a:rPr lang="en-DE" smtClean="0"/>
-              <a:t>30/11/2023</a:t>
+              <a:t>07/12/2023</a:t>
             </a:fld>
             <a:endParaRPr lang="en-DE"/>
           </a:p>
@@ -1847,7 +1847,7 @@
           <a:p>
             <a:fld id="{D5B82AE6-E612-48AC-BCA1-8D558D7A7716}" type="datetimeFigureOut">
               <a:rPr lang="en-DE" smtClean="0"/>
-              <a:t>30/11/2023</a:t>
+              <a:t>07/12/2023</a:t>
             </a:fld>
             <a:endParaRPr lang="en-DE"/>
           </a:p>
@@ -1989,7 +1989,7 @@
           <a:p>
             <a:fld id="{D5B82AE6-E612-48AC-BCA1-8D558D7A7716}" type="datetimeFigureOut">
               <a:rPr lang="en-DE" smtClean="0"/>
-              <a:t>30/11/2023</a:t>
+              <a:t>07/12/2023</a:t>
             </a:fld>
             <a:endParaRPr lang="en-DE"/>
           </a:p>
@@ -2102,7 +2102,7 @@
           <a:p>
             <a:fld id="{D5B82AE6-E612-48AC-BCA1-8D558D7A7716}" type="datetimeFigureOut">
               <a:rPr lang="en-DE" smtClean="0"/>
-              <a:t>30/11/2023</a:t>
+              <a:t>07/12/2023</a:t>
             </a:fld>
             <a:endParaRPr lang="en-DE"/>
           </a:p>
@@ -2415,7 +2415,7 @@
           <a:p>
             <a:fld id="{D5B82AE6-E612-48AC-BCA1-8D558D7A7716}" type="datetimeFigureOut">
               <a:rPr lang="en-DE" smtClean="0"/>
-              <a:t>30/11/2023</a:t>
+              <a:t>07/12/2023</a:t>
             </a:fld>
             <a:endParaRPr lang="en-DE"/>
           </a:p>
@@ -2704,7 +2704,7 @@
           <a:p>
             <a:fld id="{D5B82AE6-E612-48AC-BCA1-8D558D7A7716}" type="datetimeFigureOut">
               <a:rPr lang="en-DE" smtClean="0"/>
-              <a:t>30/11/2023</a:t>
+              <a:t>07/12/2023</a:t>
             </a:fld>
             <a:endParaRPr lang="en-DE"/>
           </a:p>
@@ -2947,7 +2947,7 @@
           <a:p>
             <a:fld id="{D5B82AE6-E612-48AC-BCA1-8D558D7A7716}" type="datetimeFigureOut">
               <a:rPr lang="en-DE" smtClean="0"/>
-              <a:t>30/11/2023</a:t>
+              <a:t>07/12/2023</a:t>
             </a:fld>
             <a:endParaRPr lang="en-DE"/>
           </a:p>
@@ -13591,15 +13591,16 @@
             </a:extLst>
           </p:cNvPr>
           <p:cNvCxnSpPr>
-            <a:stCxn id="4" idx="2"/>
+            <a:cxnSpLocks/>
+            <a:stCxn id="18" idx="2"/>
             <a:endCxn id="10" idx="0"/>
           </p:cNvCxnSpPr>
           <p:nvPr/>
         </p:nvCxnSpPr>
         <p:spPr>
           <a:xfrm>
-            <a:off x="4514072" y="3526446"/>
-            <a:ext cx="10941" cy="1189427"/>
+            <a:off x="4514071" y="4265110"/>
+            <a:ext cx="10942" cy="450763"/>
           </a:xfrm>
           <a:prstGeom prst="straightConnector1">
             <a:avLst/>
@@ -13862,8 +13863,8 @@
         </p:nvSpPr>
         <p:spPr>
           <a:xfrm>
-            <a:off x="3219734" y="5916643"/>
-            <a:ext cx="7735772" cy="646331"/>
+            <a:off x="3019006" y="5763019"/>
+            <a:ext cx="8137228" cy="923330"/>
           </a:xfrm>
           <a:prstGeom prst="rect">
             <a:avLst/>
@@ -13984,15 +13985,74 @@
             </a:r>
             <a:r>
               <a:rPr lang="de-DE" i="1" dirty="0"/>
+              <a:t> (</a:t>
+            </a:r>
+            <a:r>
+              <a:rPr lang="de-DE" i="1" dirty="0" err="1"/>
+              <a:t>akin</a:t>
+            </a:r>
+            <a:r>
+              <a:rPr lang="de-DE" i="1" dirty="0"/>
               <a:t> </a:t>
             </a:r>
+            <a:r>
+              <a:rPr lang="de-DE" i="1" dirty="0" err="1"/>
+              <a:t>to</a:t>
+            </a:r>
+            <a:r>
+              <a:rPr lang="de-DE" i="1" dirty="0"/>
+              <a:t> </a:t>
+            </a:r>
+            <a:r>
+              <a:rPr lang="de-DE" i="1" dirty="0" err="1"/>
+              <a:t>the</a:t>
+            </a:r>
+            <a:r>
+              <a:rPr lang="de-DE" i="1" dirty="0"/>
+              <a:t> </a:t>
+            </a:r>
+            <a:r>
+              <a:rPr lang="de-DE" i="1" dirty="0" err="1"/>
+              <a:t>parameters</a:t>
+            </a:r>
+            <a:r>
+              <a:rPr lang="de-DE" i="1" dirty="0"/>
+              <a:t> </a:t>
+            </a:r>
+            <a:r>
+              <a:rPr lang="de-DE" i="1" dirty="0" err="1"/>
+              <a:t>of</a:t>
+            </a:r>
+            <a:r>
+              <a:rPr lang="de-DE" i="1" dirty="0"/>
+              <a:t> </a:t>
+            </a:r>
+            <a:r>
+              <a:rPr lang="de-DE" i="1" dirty="0" err="1"/>
+              <a:t>somple</a:t>
+            </a:r>
+            <a:r>
+              <a:rPr lang="de-DE" i="1" dirty="0"/>
+              <a:t> source) </a:t>
+            </a:r>
+            <a:br>
+              <a:rPr lang="de-DE" i="1" dirty="0"/>
+            </a:br>
             <a:r>
               <a:rPr lang="de-DE" i="1" dirty="0" err="1"/>
               <a:t>used</a:t>
             </a:r>
             <a:r>
               <a:rPr lang="de-DE" i="1" dirty="0"/>
-              <a:t> in </a:t>
+              <a:t> </a:t>
+            </a:r>
+            <a:r>
+              <a:rPr lang="de-DE" i="1" dirty="0" err="1"/>
+              <a:t>for</a:t>
+            </a:r>
+            <a:r>
+              <a:rPr lang="de-DE" i="1" dirty="0"/>
+              <a:t> </a:t>
             </a:r>
             <a:r>
               <a:rPr lang="de-DE" i="1" dirty="0" err="1"/>
@@ -14019,6 +14079,69 @@
               <a:t> UI.</a:t>
             </a:r>
             <a:endParaRPr lang="en-DE" i="1" dirty="0"/>
+          </a:p>
+        </p:txBody>
+      </p:sp>
+      <p:sp>
+        <p:nvSpPr>
+          <p:cNvPr id="18" name="TextBox 17">
+            <a:extLst>
+              <a:ext uri="{FF2B5EF4-FFF2-40B4-BE49-F238E27FC236}">
+                <a16:creationId xmlns:a16="http://schemas.microsoft.com/office/drawing/2014/main" id="{0BA6ECED-9DAC-4336-BB7B-017F0E3D6CEA}"/>
+              </a:ext>
+            </a:extLst>
+          </p:cNvPr>
+          <p:cNvSpPr txBox="1"/>
+          <p:nvPr/>
+        </p:nvSpPr>
+        <p:spPr>
+          <a:xfrm>
+            <a:off x="3774958" y="3526446"/>
+            <a:ext cx="1478225" cy="738664"/>
+          </a:xfrm>
+          <a:prstGeom prst="rect">
+            <a:avLst/>
+          </a:prstGeom>
+          <a:solidFill>
+            <a:schemeClr val="bg1"/>
+          </a:solidFill>
+          <a:ln>
+            <a:solidFill>
+              <a:schemeClr val="accent1"/>
+            </a:solidFill>
+          </a:ln>
+        </p:spPr>
+        <p:txBody>
+          <a:bodyPr wrap="square" rtlCol="0">
+            <a:spAutoFit/>
+          </a:bodyPr>
+          <a:lstStyle/>
+          <a:p>
+            <a:r>
+              <a:rPr lang="en-GB" sz="1400" b="1" dirty="0"/>
+              <a:t>Parameter:</a:t>
+            </a:r>
+          </a:p>
+          <a:p>
+            <a:r>
+              <a:rPr lang="en-GB" sz="1400" dirty="0" err="1"/>
+              <a:t>camIP</a:t>
+            </a:r>
+            <a:r>
+              <a:rPr lang="en-GB" sz="1400" dirty="0"/>
+              <a:t>: String</a:t>
+            </a:r>
+          </a:p>
+          <a:p>
+            <a:r>
+              <a:rPr lang="en-GB" sz="1400" dirty="0" err="1"/>
+              <a:t>camPort</a:t>
+            </a:r>
+            <a:r>
+              <a:rPr lang="en-GB" sz="1400" dirty="0"/>
+              <a:t>: Integer</a:t>
+            </a:r>
+            <a:endParaRPr lang="en-DE" sz="1400" dirty="0"/>
           </a:p>
         </p:txBody>
       </p:sp>

</xml_diff>